<commit_message>
Update Banner IC Unip azul 2023_APS.pptx
correções banner
</commit_message>
<xml_diff>
--- a/Banner IC Unip azul 2023_APS.pptx
+++ b/Banner IC Unip azul 2023_APS.pptx
@@ -13188,7 +13188,7 @@
         <p:spPr>
           <a:xfrm>
             <a:off x="2553553" y="9374984"/>
-            <a:ext cx="12743640" cy="24327795"/>
+            <a:ext cx="12743640" cy="25585319"/>
           </a:xfrm>
           <a:prstGeom prst="rect">
             <a:avLst/>
@@ -13285,59 +13285,44 @@
             <a:pPr algn="ctr"/>
             <a:endParaRPr lang="pt-BR" sz="4400" dirty="0">
               <a:solidFill>
-                <a:srgbClr val="002060"/>
+                <a:schemeClr val="tx1">
+                  <a:lumMod val="50000"/>
+                </a:schemeClr>
               </a:solidFill>
-              <a:latin typeface="+mj-lt"/>
+              <a:latin typeface="Calibri" panose="020F0502020204030204" pitchFamily="34" charset="0"/>
+              <a:ea typeface="Calibri" panose="020F0502020204030204" pitchFamily="34" charset="0"/>
+              <a:cs typeface="Calibri" panose="020F0502020204030204" pitchFamily="34" charset="0"/>
             </a:endParaRPr>
           </a:p>
           <a:p>
-            <a:pPr algn="ctr">
-              <a:lnSpc>
-                <a:spcPct val="107000"/>
-              </a:lnSpc>
-              <a:spcAft>
-                <a:spcPts val="800"/>
-              </a:spcAft>
-            </a:pPr>
+            <a:pPr algn="ctr"/>
             <a:r>
-              <a:rPr lang="pt-BR" sz="4400" kern="100" dirty="0">
+              <a:rPr lang="pt-BR" sz="4400" i="0" dirty="0">
                 <a:solidFill>
                   <a:srgbClr val="002060"/>
                 </a:solidFill>
                 <a:effectLst/>
                 <a:latin typeface="Calibri" panose="020F0502020204030204" pitchFamily="34" charset="0"/>
                 <a:ea typeface="Calibri" panose="020F0502020204030204" pitchFamily="34" charset="0"/>
-                <a:cs typeface="Times New Roman" panose="02020603050405020304" pitchFamily="18" charset="0"/>
+                <a:cs typeface="Calibri" panose="020F0502020204030204" pitchFamily="34" charset="0"/>
               </a:rPr>
-              <a:t>O transporte publico Urbano de São Paulo em grande parte é composto por empresas terceirizadas que contam com cerca de 12 mil ônibus rodando diariamente, implementando metas de redução com prazos a serem seguidos em qual empresas que não conseguirem atingir podem compensar através do incentivo por meio do credito de carbono. Método já existente em diversas empresas por meio voluntario mostrando um enorme sucesso.</a:t>
+              <a:t>O transporte público urbano de São Paulo, em sua grande maioria, é operado por empresas terceirizadas, que mantêm cerca de 12 mil ônibus circulando diariamente. A implementação de metas de redução, com prazos definidos, é uma estratégia para combater as emissões de CO². Empresas que não conseguirem atingir essas metas teriam a opção de compensar suas emissões por meio de incentivos, como créditos de carbono. Esse método já é adotado por diversas empresas de forma voluntária e tem mostrado um enorme sucesso.</a:t>
             </a:r>
           </a:p>
           <a:p>
-            <a:pPr algn="ctr">
-              <a:lnSpc>
-                <a:spcPct val="107000"/>
-              </a:lnSpc>
-              <a:spcAft>
-                <a:spcPts val="800"/>
-              </a:spcAft>
-            </a:pPr>
+            <a:pPr algn="ctr"/>
             <a:r>
-              <a:rPr lang="pt-BR" sz="4400" kern="100" dirty="0">
+              <a:rPr lang="pt-BR" sz="4400" i="0" dirty="0">
                 <a:solidFill>
                   <a:srgbClr val="002060"/>
                 </a:solidFill>
+                <a:effectLst/>
                 <a:latin typeface="Calibri" panose="020F0502020204030204" pitchFamily="34" charset="0"/>
                 <a:ea typeface="Calibri" panose="020F0502020204030204" pitchFamily="34" charset="0"/>
-                <a:cs typeface="Times New Roman" panose="02020603050405020304" pitchFamily="18" charset="0"/>
+                <a:cs typeface="Calibri" panose="020F0502020204030204" pitchFamily="34" charset="0"/>
               </a:rPr>
-              <a:t>Criamos um programa no qual as empresas de transporte podem ter o conhecimento das suas emissões e a partir disso ter suas metas determinadas.</a:t>
+              <a:t>Propomos a criação de um programa que permita às empresas de transporte calcular suas emissões e, a partir desses dados, estabelecer metas específicas para redução.</a:t>
             </a:r>
-            <a:endParaRPr lang="pt-BR" sz="4400" dirty="0">
-              <a:solidFill>
-                <a:srgbClr val="002060"/>
-              </a:solidFill>
-              <a:latin typeface="+mj-lt"/>
-            </a:endParaRPr>
           </a:p>
           <a:p>
             <a:pPr algn="ctr"/>

</xml_diff>